<commit_message>
edited README.md and pptx
</commit_message>
<xml_diff>
--- a/FTC_on-bot_java_coding_introduction.pptx
+++ b/FTC_on-bot_java_coding_introduction.pptx
@@ -1481,7 +1481,7 @@
         </p:nvSpPr>
         <p:spPr>
           <a:xfrm>
-            <a:off x="381300" y="685800"/>
+            <a:off x="381000" y="685800"/>
             <a:ext cx="6096000" cy="3429000"/>
           </a:xfrm>
           <a:custGeom>
@@ -9151,7 +9151,7 @@
         </p:blipFill>
         <p:spPr>
           <a:xfrm>
-            <a:off x="2380925" y="1690712"/>
+            <a:off x="2376307" y="1910962"/>
             <a:ext cx="2244475" cy="1321575"/>
           </a:xfrm>
           <a:prstGeom prst="rect">
@@ -9179,7 +9179,7 @@
         </p:blipFill>
         <p:spPr>
           <a:xfrm>
-            <a:off x="1441949" y="3368974"/>
+            <a:off x="1441948" y="3716643"/>
             <a:ext cx="4404750" cy="368275"/>
           </a:xfrm>
           <a:prstGeom prst="rect">
@@ -9626,7 +9626,7 @@
         </p:nvGraphicFramePr>
         <p:xfrm>
           <a:off x="688525" y="1590925"/>
-          <a:ext cx="3000000" cy="3000000"/>
+          <a:ext cx="6756300" cy="3494380"/>
         </p:xfrm>
         <a:graphic>
           <a:graphicData uri="http://schemas.openxmlformats.org/drawingml/2006/table">
@@ -11521,14 +11521,14 @@
               <a:buNone/>
             </a:pPr>
             <a:r>
-              <a:rPr lang="en" sz="1800">
+              <a:rPr lang="en" sz="1800" dirty="0">
                 <a:solidFill>
                   <a:schemeClr val="dk2"/>
                 </a:solidFill>
               </a:rPr>
               <a:t>I have given a more in depth explanation within the “ExampleUtility” file in the repo. </a:t>
             </a:r>
-            <a:endParaRPr sz="1800">
+            <a:endParaRPr sz="1800" dirty="0">
               <a:solidFill>
                 <a:schemeClr val="dk2"/>
               </a:solidFill>
@@ -11544,7 +11544,7 @@
               </a:spcAft>
               <a:buNone/>
             </a:pPr>
-            <a:endParaRPr sz="1800">
+            <a:endParaRPr sz="1800" dirty="0">
               <a:solidFill>
                 <a:schemeClr val="dk2"/>
               </a:solidFill>
@@ -11561,14 +11561,14 @@
               <a:buNone/>
             </a:pPr>
             <a:r>
-              <a:rPr lang="en" sz="1800">
+              <a:rPr lang="en" sz="1800" dirty="0">
                 <a:solidFill>
                   <a:schemeClr val="dk2"/>
                 </a:solidFill>
               </a:rPr>
               <a:t>Please check that out</a:t>
             </a:r>
-            <a:endParaRPr sz="1800">
+            <a:endParaRPr sz="1800" dirty="0">
               <a:solidFill>
                 <a:schemeClr val="dk2"/>
               </a:solidFill>
@@ -12213,10 +12213,10 @@
               <a:buNone/>
             </a:pPr>
             <a:r>
-              <a:rPr lang="en"/>
+              <a:rPr lang="en" dirty="0"/>
               <a:t>Important remarks</a:t>
             </a:r>
-            <a:endParaRPr/>
+            <a:endParaRPr dirty="0"/>
           </a:p>
         </p:txBody>
       </p:sp>
@@ -12241,7 +12241,7 @@
         </p:spPr>
         <p:txBody>
           <a:bodyPr spcFirstLastPara="1" wrap="square" lIns="91425" tIns="91425" rIns="91425" bIns="91425" anchor="t" anchorCtr="0">
-            <a:normAutofit fontScale="70000" lnSpcReduction="10000"/>
+            <a:normAutofit fontScale="70000" lnSpcReduction="20000"/>
           </a:bodyPr>
           <a:lstStyle/>
           <a:p>
@@ -12255,10 +12255,10 @@
               <a:buNone/>
             </a:pPr>
             <a:r>
-              <a:rPr lang="en"/>
+              <a:rPr lang="en" dirty="0"/>
               <a:t>Functions can also be called methods.</a:t>
             </a:r>
-            <a:endParaRPr/>
+            <a:endParaRPr dirty="0"/>
           </a:p>
           <a:p>
             <a:pPr marL="0" lvl="0" indent="0" algn="l" rtl="0">
@@ -12271,10 +12271,10 @@
               <a:buNone/>
             </a:pPr>
             <a:r>
-              <a:rPr lang="en"/>
+              <a:rPr lang="en" dirty="0"/>
               <a:t>From now on, google is you best friend. If you don’t know how to, or whether you can do something with a class or otherwise, look it up, the information age is incredible like that. If you can’t understand what the internet is telling you or can’t find the right information, just ask, please. It is not your fault and you should not feel bad for not being able to figure stuff out, programming can be very hard and diving in is a monumental task, well done.</a:t>
             </a:r>
-            <a:endParaRPr/>
+            <a:endParaRPr dirty="0"/>
           </a:p>
           <a:p>
             <a:pPr marL="0" lvl="0" indent="0" algn="l" rtl="0">
@@ -12287,10 +12287,10 @@
               <a:buNone/>
             </a:pPr>
             <a:r>
-              <a:rPr lang="en"/>
+              <a:rPr lang="en" dirty="0"/>
               <a:t>Programming is the same as any other discipline, it is not a dark art known to the few, but it will require you to practice and actively research to get better at it.</a:t>
             </a:r>
-            <a:endParaRPr/>
+            <a:endParaRPr dirty="0"/>
           </a:p>
           <a:p>
             <a:pPr marL="0" lvl="0" indent="0" algn="l" rtl="0">
@@ -12303,10 +12303,10 @@
               <a:buNone/>
             </a:pPr>
             <a:r>
-              <a:rPr lang="en"/>
+              <a:rPr lang="en" dirty="0"/>
               <a:t>I will be updating the github repo. Not all the information you will need is on there yet, but i will do my best to add more and more examples and explanations into it.</a:t>
             </a:r>
-            <a:endParaRPr/>
+            <a:endParaRPr dirty="0"/>
           </a:p>
           <a:p>
             <a:pPr marL="0" lvl="0" indent="0" algn="l" rtl="0">
@@ -12319,10 +12319,10 @@
               <a:buNone/>
             </a:pPr>
             <a:r>
-              <a:rPr lang="en"/>
+              <a:rPr lang="en" dirty="0"/>
               <a:t>The FTC starter code comes with a plethora of examples for how to use their classes. These exist under “FtcRobotController/src/main/java/org/firstinspires/ftc/robotcontroller/external/samples”, or (in android studio)</a:t>
             </a:r>
-            <a:endParaRPr/>
+            <a:endParaRPr dirty="0"/>
           </a:p>
           <a:p>
             <a:pPr marL="0" lvl="0" indent="0" algn="l" rtl="0">
@@ -12335,10 +12335,10 @@
               <a:buNone/>
             </a:pPr>
             <a:r>
-              <a:rPr lang="en"/>
-              <a:t>“ FtcRobotController/java/org.firstinspires.ftc.robotcontroller/external.sampes</a:t>
-            </a:r>
-            <a:endParaRPr/>
+              <a:rPr lang="en" dirty="0"/>
+              <a:t>“FtcRobotController/java/org.firstinspires.ftc.robotcontroller/external.sampes”</a:t>
+            </a:r>
+            <a:endParaRPr dirty="0"/>
           </a:p>
         </p:txBody>
       </p:sp>

</xml_diff>

<commit_message>
edited pptx and added two wheel omni drive example
</commit_message>
<xml_diff>
--- a/FTC_on-bot_java_coding_introduction.pptx
+++ b/FTC_on-bot_java_coding_introduction.pptx
@@ -5,7 +5,7 @@
     <p:sldMasterId id="2147483659" r:id="rId1"/>
   </p:sldMasterIdLst>
   <p:notesMasterIdLst>
-    <p:notesMasterId r:id="rId26"/>
+    <p:notesMasterId r:id="rId27"/>
   </p:notesMasterIdLst>
   <p:sldIdLst>
     <p:sldId id="256" r:id="rId2"/>
@@ -31,7 +31,8 @@
     <p:sldId id="276" r:id="rId22"/>
     <p:sldId id="277" r:id="rId23"/>
     <p:sldId id="278" r:id="rId24"/>
-    <p:sldId id="279" r:id="rId25"/>
+    <p:sldId id="280" r:id="rId25"/>
+    <p:sldId id="279" r:id="rId26"/>
   </p:sldIdLst>
   <p:sldSz cx="9144000" cy="5143500" type="screen16x9"/>
   <p:notesSz cx="6858000" cy="9144000"/>
@@ -1793,7 +1794,7 @@
         </p:nvSpPr>
         <p:spPr>
           <a:xfrm>
-            <a:off x="381300" y="685800"/>
+            <a:off x="381000" y="685800"/>
             <a:ext cx="6096000" cy="3429000"/>
           </a:xfrm>
           <a:custGeom>
@@ -2937,7 +2938,7 @@
         </p:nvSpPr>
         <p:spPr>
           <a:xfrm>
-            <a:off x="381300" y="685800"/>
+            <a:off x="381000" y="685800"/>
             <a:ext cx="6096000" cy="3429000"/>
           </a:xfrm>
           <a:custGeom>
@@ -9123,7 +9124,7 @@
         </p:blipFill>
         <p:spPr>
           <a:xfrm>
-            <a:off x="2497773" y="643200"/>
+            <a:off x="2497773" y="713182"/>
             <a:ext cx="2293100" cy="690800"/>
           </a:xfrm>
           <a:prstGeom prst="rect">
@@ -10956,10 +10957,10 @@
               <a:buNone/>
             </a:pPr>
             <a:r>
-              <a:rPr lang="en"/>
+              <a:rPr lang="en" dirty="0"/>
               <a:t>Some important terminology you will probably hear me say a LOT.</a:t>
             </a:r>
-            <a:endParaRPr/>
+            <a:endParaRPr dirty="0"/>
           </a:p>
           <a:p>
             <a:pPr marL="0" lvl="0" indent="0" algn="l" rtl="0">
@@ -10972,10 +10973,10 @@
               <a:buNone/>
             </a:pPr>
             <a:r>
-              <a:rPr lang="en"/>
+              <a:rPr lang="en" dirty="0"/>
               <a:t>The code you write for a class acts only as a definition of that class. Some of this code will be inaccessible until you INSTANTIATE an instance of that class. A.k.a you create an instance of a class.</a:t>
             </a:r>
-            <a:endParaRPr/>
+            <a:endParaRPr dirty="0"/>
           </a:p>
           <a:p>
             <a:pPr marL="0" lvl="0" indent="0" algn="l" rtl="0">
@@ -10988,10 +10989,10 @@
               <a:buNone/>
             </a:pPr>
             <a:r>
-              <a:rPr lang="en"/>
+              <a:rPr lang="en" dirty="0"/>
               <a:t>An instance of a class is called an OBJECT. E.g. an instance of a String is a String Object</a:t>
             </a:r>
-            <a:endParaRPr/>
+            <a:endParaRPr dirty="0"/>
           </a:p>
           <a:p>
             <a:pPr marL="0" lvl="0" indent="0" algn="l" rtl="0">
@@ -11004,10 +11005,10 @@
               <a:buNone/>
             </a:pPr>
             <a:r>
-              <a:rPr lang="en"/>
+              <a:rPr lang="en" dirty="0"/>
               <a:t>Objects can be DECLARED, before they are instantiated. E.g. </a:t>
             </a:r>
-            <a:endParaRPr/>
+            <a:endParaRPr dirty="0"/>
           </a:p>
           <a:p>
             <a:pPr marL="0" lvl="0" indent="0" algn="l" rtl="0">
@@ -11019,36 +11020,38 @@
               </a:spcAft>
               <a:buNone/>
             </a:pPr>
-            <a:endParaRPr/>
+            <a:endParaRPr dirty="0"/>
           </a:p>
         </p:txBody>
       </p:sp>
       <p:pic>
         <p:nvPicPr>
-          <p:cNvPr id="180" name="Google Shape;180;p31"/>
-          <p:cNvPicPr preferRelativeResize="0"/>
+          <p:cNvPr id="3" name="Picture 2">
+            <a:extLst>
+              <a:ext uri="{FF2B5EF4-FFF2-40B4-BE49-F238E27FC236}">
+                <a16:creationId xmlns:a16="http://schemas.microsoft.com/office/drawing/2014/main" id="{1C106340-BB71-0486-E413-AD2EBC81B5A2}"/>
+              </a:ext>
+            </a:extLst>
+          </p:cNvPr>
+          <p:cNvPicPr>
+            <a:picLocks noChangeAspect="1"/>
+          </p:cNvPicPr>
           <p:nvPr/>
         </p:nvPicPr>
         <p:blipFill>
-          <a:blip r:embed="rId3">
-            <a:alphaModFix/>
-          </a:blip>
+          <a:blip r:embed="rId3"/>
           <a:stretch>
             <a:fillRect/>
           </a:stretch>
         </p:blipFill>
         <p:spPr>
           <a:xfrm>
-            <a:off x="968873" y="3943248"/>
-            <a:ext cx="7065650" cy="967575"/>
+            <a:off x="914399" y="3991025"/>
+            <a:ext cx="6973512" cy="905164"/>
           </a:xfrm>
           <a:prstGeom prst="rect">
             <a:avLst/>
           </a:prstGeom>
-          <a:noFill/>
-          <a:ln>
-            <a:noFill/>
-          </a:ln>
         </p:spPr>
       </p:pic>
     </p:spTree>
@@ -12166,6 +12169,232 @@
   <p:cSld>
     <p:spTree>
       <p:nvGrpSpPr>
+        <p:cNvPr id="1" name=""/>
+        <p:cNvGrpSpPr/>
+        <p:nvPr/>
+      </p:nvGrpSpPr>
+      <p:grpSpPr>
+        <a:xfrm>
+          <a:off x="0" y="0"/>
+          <a:ext cx="0" cy="0"/>
+          <a:chOff x="0" y="0"/>
+          <a:chExt cx="0" cy="0"/>
+        </a:xfrm>
+      </p:grpSpPr>
+      <p:sp>
+        <p:nvSpPr>
+          <p:cNvPr id="2" name="Title 1">
+            <a:extLst>
+              <a:ext uri="{FF2B5EF4-FFF2-40B4-BE49-F238E27FC236}">
+                <a16:creationId xmlns:a16="http://schemas.microsoft.com/office/drawing/2014/main" id="{0E0B77CC-018D-7A53-2B07-9CAE5B9E7959}"/>
+              </a:ext>
+            </a:extLst>
+          </p:cNvPr>
+          <p:cNvSpPr>
+            <a:spLocks noGrp="1"/>
+          </p:cNvSpPr>
+          <p:nvPr>
+            <p:ph type="title"/>
+          </p:nvPr>
+        </p:nvSpPr>
+        <p:spPr>
+          <a:xfrm>
+            <a:off x="311700" y="241825"/>
+            <a:ext cx="8520600" cy="572700"/>
+          </a:xfrm>
+        </p:spPr>
+        <p:txBody>
+          <a:bodyPr>
+            <a:normAutofit fontScale="90000"/>
+          </a:bodyPr>
+          <a:lstStyle/>
+          <a:p>
+            <a:r>
+              <a:rPr lang="en-AU" dirty="0"/>
+              <a:t>Naming conventions</a:t>
+            </a:r>
+          </a:p>
+        </p:txBody>
+      </p:sp>
+      <p:sp>
+        <p:nvSpPr>
+          <p:cNvPr id="3" name="Text Placeholder 2">
+            <a:extLst>
+              <a:ext uri="{FF2B5EF4-FFF2-40B4-BE49-F238E27FC236}">
+                <a16:creationId xmlns:a16="http://schemas.microsoft.com/office/drawing/2014/main" id="{6F9DFA61-BAF7-895E-BEE5-64ECEC76152F}"/>
+              </a:ext>
+            </a:extLst>
+          </p:cNvPr>
+          <p:cNvSpPr>
+            <a:spLocks noGrp="1"/>
+          </p:cNvSpPr>
+          <p:nvPr>
+            <p:ph type="body" idx="1"/>
+          </p:nvPr>
+        </p:nvSpPr>
+        <p:spPr>
+          <a:xfrm>
+            <a:off x="311700" y="882073"/>
+            <a:ext cx="8520600" cy="3686802"/>
+          </a:xfrm>
+        </p:spPr>
+        <p:txBody>
+          <a:bodyPr>
+            <a:normAutofit/>
+          </a:bodyPr>
+          <a:lstStyle/>
+          <a:p>
+            <a:pPr marL="114300" indent="0">
+              <a:buNone/>
+            </a:pPr>
+            <a:r>
+              <a:rPr lang="en-AU" sz="1400" dirty="0"/>
+              <a:t>Picking and sticking to a naming convention is very important in maintaining the readability of your code.</a:t>
+            </a:r>
+          </a:p>
+          <a:p>
+            <a:pPr marL="114300" indent="0">
+              <a:buNone/>
+            </a:pPr>
+            <a:r>
+              <a:rPr lang="en-AU" sz="1400" dirty="0"/>
+              <a:t>The most important part of this is that you use detailed names for everything. For example, a variable called “p” could mean: place, person, point, pointer etcetera.</a:t>
+            </a:r>
+          </a:p>
+          <a:p>
+            <a:pPr marL="114300" indent="0">
+              <a:buNone/>
+            </a:pPr>
+            <a:r>
+              <a:rPr lang="en-AU" sz="1400" dirty="0"/>
+              <a:t>You only know what it is and therefore what it is used for through context, which we do not want. Prefer longer, more detailed names.</a:t>
+            </a:r>
+          </a:p>
+          <a:p>
+            <a:pPr marL="114300" indent="0">
+              <a:buNone/>
+            </a:pPr>
+            <a:endParaRPr lang="en-AU" sz="1400" dirty="0"/>
+          </a:p>
+          <a:p>
+            <a:pPr marL="114300" indent="0">
+              <a:buNone/>
+            </a:pPr>
+            <a:r>
+              <a:rPr lang="en-AU" sz="1400" dirty="0"/>
+              <a:t>Second to this, is the way in which you capitalise your names. The industry standard is called Camel Case. Camel case uses no spaces or underscores, instead capitalising the first letter of each word (excluding the first), if a name contains multiple words. The exception to this is for classes, which capitalise the first letter of the first word as well. For example:</a:t>
+            </a:r>
+          </a:p>
+          <a:p>
+            <a:pPr marL="114300" indent="0">
+              <a:buNone/>
+            </a:pPr>
+            <a:r>
+              <a:rPr lang="en-AU" sz="1400" dirty="0"/>
+              <a:t>A variable could be called: </a:t>
+            </a:r>
+            <a:r>
+              <a:rPr lang="en-AU" sz="1400" dirty="0" err="1"/>
+              <a:t>firstName</a:t>
+            </a:r>
+            <a:r>
+              <a:rPr lang="en-AU" sz="1400" dirty="0"/>
+              <a:t>, </a:t>
+            </a:r>
+            <a:r>
+              <a:rPr lang="en-AU" sz="1400" dirty="0" err="1"/>
+              <a:t>fileDescription</a:t>
+            </a:r>
+            <a:r>
+              <a:rPr lang="en-AU" sz="1400" dirty="0"/>
+              <a:t>, </a:t>
+            </a:r>
+            <a:r>
+              <a:rPr lang="en-AU" sz="1400" dirty="0" err="1"/>
+              <a:t>leftMotor</a:t>
+            </a:r>
+            <a:endParaRPr lang="en-AU" sz="1400" dirty="0"/>
+          </a:p>
+          <a:p>
+            <a:pPr marL="114300" indent="0">
+              <a:buNone/>
+            </a:pPr>
+            <a:r>
+              <a:rPr lang="en-AU" sz="1400" dirty="0"/>
+              <a:t>A function could be called: </a:t>
+            </a:r>
+            <a:r>
+              <a:rPr lang="en-AU" sz="1400" dirty="0" err="1"/>
+              <a:t>calculateOffset</a:t>
+            </a:r>
+            <a:r>
+              <a:rPr lang="en-AU" sz="1400" dirty="0"/>
+              <a:t>, </a:t>
+            </a:r>
+            <a:r>
+              <a:rPr lang="en-AU" sz="1400" dirty="0" err="1"/>
+              <a:t>isActive</a:t>
+            </a:r>
+            <a:r>
+              <a:rPr lang="en-AU" sz="1400" dirty="0"/>
+              <a:t>, </a:t>
+            </a:r>
+            <a:r>
+              <a:rPr lang="en-AU" sz="1400" dirty="0" err="1"/>
+              <a:t>getPower</a:t>
+            </a:r>
+            <a:endParaRPr lang="en-AU" sz="1400" dirty="0"/>
+          </a:p>
+          <a:p>
+            <a:pPr marL="114300" indent="0">
+              <a:buNone/>
+            </a:pPr>
+            <a:r>
+              <a:rPr lang="en-AU" sz="1400" dirty="0"/>
+              <a:t>A class could be called: </a:t>
+            </a:r>
+            <a:r>
+              <a:rPr lang="en-AU" sz="1400" dirty="0" err="1"/>
+              <a:t>ExampleUtility</a:t>
+            </a:r>
+            <a:r>
+              <a:rPr lang="en-AU" sz="1400" dirty="0"/>
+              <a:t>, </a:t>
+            </a:r>
+            <a:r>
+              <a:rPr lang="en-AU" sz="1400" dirty="0" err="1"/>
+              <a:t>MechanumDrive</a:t>
+            </a:r>
+            <a:r>
+              <a:rPr lang="en-AU" sz="1400" dirty="0"/>
+              <a:t>, </a:t>
+            </a:r>
+            <a:r>
+              <a:rPr lang="en-AU" sz="1400" dirty="0" err="1"/>
+              <a:t>PathPlotter</a:t>
+            </a:r>
+            <a:endParaRPr lang="en-AU" sz="1400" dirty="0"/>
+          </a:p>
+        </p:txBody>
+      </p:sp>
+    </p:spTree>
+    <p:extLst>
+      <p:ext uri="{BB962C8B-B14F-4D97-AF65-F5344CB8AC3E}">
+        <p14:creationId xmlns:p14="http://schemas.microsoft.com/office/powerpoint/2010/main" val="606913766"/>
+      </p:ext>
+    </p:extLst>
+  </p:cSld>
+  <p:clrMapOvr>
+    <a:masterClrMapping/>
+  </p:clrMapOvr>
+</p:sld>
+</file>
+
+<file path=ppt/slides/slide25.xml><?xml version="1.0" encoding="utf-8"?>
+<p:sld xmlns:a="http://schemas.openxmlformats.org/drawingml/2006/main" xmlns:r="http://schemas.openxmlformats.org/officeDocument/2006/relationships" xmlns:p="http://schemas.openxmlformats.org/presentationml/2006/main">
+  <p:cSld>
+    <p:spTree>
+      <p:nvGrpSpPr>
         <p:cNvPr id="1" name="Shape 213"/>
         <p:cNvGrpSpPr/>
         <p:nvPr/>
@@ -13325,10 +13554,59 @@
               <a:buNone/>
             </a:pPr>
             <a:r>
-              <a:rPr lang="en"/>
+              <a:rPr lang="en" dirty="0"/>
               <a:t>Basic OpMode file setup/boilerplate</a:t>
             </a:r>
-            <a:endParaRPr/>
+            <a:endParaRPr dirty="0"/>
+          </a:p>
+        </p:txBody>
+      </p:sp>
+      <p:sp>
+        <p:nvSpPr>
+          <p:cNvPr id="2" name="Rectangle 1">
+            <a:extLst>
+              <a:ext uri="{FF2B5EF4-FFF2-40B4-BE49-F238E27FC236}">
+                <a16:creationId xmlns:a16="http://schemas.microsoft.com/office/drawing/2014/main" id="{F05B4FE8-5E44-E76D-BFF9-337EC58DC96F}"/>
+              </a:ext>
+            </a:extLst>
+          </p:cNvPr>
+          <p:cNvSpPr/>
+          <p:nvPr/>
+        </p:nvSpPr>
+        <p:spPr>
+          <a:xfrm>
+            <a:off x="226291" y="854364"/>
+            <a:ext cx="4050145" cy="4091709"/>
+          </a:xfrm>
+          <a:prstGeom prst="rect">
+            <a:avLst/>
+          </a:prstGeom>
+          <a:ln>
+            <a:noFill/>
+          </a:ln>
+        </p:spPr>
+        <p:style>
+          <a:lnRef idx="2">
+            <a:schemeClr val="accent2">
+              <a:shade val="15000"/>
+            </a:schemeClr>
+          </a:lnRef>
+          <a:fillRef idx="1">
+            <a:schemeClr val="accent2"/>
+          </a:fillRef>
+          <a:effectRef idx="0">
+            <a:schemeClr val="accent2"/>
+          </a:effectRef>
+          <a:fontRef idx="minor">
+            <a:schemeClr val="lt1"/>
+          </a:fontRef>
+        </p:style>
+        <p:txBody>
+          <a:bodyPr rtlCol="0" anchor="ctr"/>
+          <a:lstStyle/>
+          <a:p>
+            <a:pPr algn="ctr"/>
+            <a:endParaRPr lang="en-AU"/>
           </a:p>
         </p:txBody>
       </p:sp>
@@ -13367,13 +13645,10 @@
               <a:buNone/>
             </a:pPr>
             <a:r>
-              <a:rPr lang="en" sz="700">
+              <a:rPr lang="en" sz="700" dirty="0">
                 <a:solidFill>
                   <a:srgbClr val="CC7832"/>
                 </a:solidFill>
-                <a:highlight>
-                  <a:schemeClr val="lt1"/>
-                </a:highlight>
                 <a:latin typeface="Courier New"/>
                 <a:ea typeface="Courier New"/>
                 <a:cs typeface="Courier New"/>
@@ -13382,13 +13657,10 @@
               <a:t>package </a:t>
             </a:r>
             <a:r>
-              <a:rPr lang="en" sz="700">
+              <a:rPr lang="en" sz="700" dirty="0">
                 <a:solidFill>
                   <a:srgbClr val="A9B7C6"/>
                 </a:solidFill>
-                <a:highlight>
-                  <a:schemeClr val="lt1"/>
-                </a:highlight>
                 <a:latin typeface="Courier New"/>
                 <a:ea typeface="Courier New"/>
                 <a:cs typeface="Courier New"/>
@@ -13397,13 +13669,10 @@
               <a:t>org.firstinspires.ftc.teamcode.Sarters</a:t>
             </a:r>
             <a:r>
-              <a:rPr lang="en" sz="700">
+              <a:rPr lang="en" sz="700" dirty="0">
                 <a:solidFill>
                   <a:srgbClr val="CC7832"/>
                 </a:solidFill>
-                <a:highlight>
-                  <a:schemeClr val="lt1"/>
-                </a:highlight>
                 <a:latin typeface="Courier New"/>
                 <a:ea typeface="Courier New"/>
                 <a:cs typeface="Courier New"/>
@@ -13411,13 +13680,10 @@
               </a:rPr>
               <a:t>;</a:t>
             </a:r>
-            <a:endParaRPr sz="700">
+            <a:endParaRPr sz="700" dirty="0">
               <a:solidFill>
                 <a:srgbClr val="CC7832"/>
               </a:solidFill>
-              <a:highlight>
-                <a:schemeClr val="lt1"/>
-              </a:highlight>
               <a:latin typeface="Courier New"/>
               <a:ea typeface="Courier New"/>
               <a:cs typeface="Courier New"/>
@@ -13434,13 +13700,10 @@
               </a:spcAft>
               <a:buNone/>
             </a:pPr>
-            <a:endParaRPr sz="700">
+            <a:endParaRPr sz="700" dirty="0">
               <a:solidFill>
                 <a:srgbClr val="CC7832"/>
               </a:solidFill>
-              <a:highlight>
-                <a:schemeClr val="lt1"/>
-              </a:highlight>
               <a:latin typeface="Courier New"/>
               <a:ea typeface="Courier New"/>
               <a:cs typeface="Courier New"/>
@@ -13458,13 +13721,10 @@
               <a:buNone/>
             </a:pPr>
             <a:r>
-              <a:rPr lang="en" sz="700">
+              <a:rPr lang="en" sz="700" dirty="0">
                 <a:solidFill>
                   <a:srgbClr val="CC7832"/>
                 </a:solidFill>
-                <a:highlight>
-                  <a:schemeClr val="lt1"/>
-                </a:highlight>
                 <a:latin typeface="Courier New"/>
                 <a:ea typeface="Courier New"/>
                 <a:cs typeface="Courier New"/>
@@ -13473,13 +13733,10 @@
               <a:t>import </a:t>
             </a:r>
             <a:r>
-              <a:rPr lang="en" sz="700">
+              <a:rPr lang="en" sz="700" dirty="0">
                 <a:solidFill>
                   <a:srgbClr val="A9B7C6"/>
                 </a:solidFill>
-                <a:highlight>
-                  <a:schemeClr val="lt1"/>
-                </a:highlight>
                 <a:latin typeface="Courier New"/>
                 <a:ea typeface="Courier New"/>
                 <a:cs typeface="Courier New"/>
@@ -13488,13 +13745,10 @@
               <a:t>com.qualcomm.robotcore.eventloop.opmode.</a:t>
             </a:r>
             <a:r>
-              <a:rPr lang="en" sz="700">
+              <a:rPr lang="en" sz="700" dirty="0">
                 <a:solidFill>
                   <a:srgbClr val="BBB529"/>
                 </a:solidFill>
-                <a:highlight>
-                  <a:schemeClr val="lt1"/>
-                </a:highlight>
                 <a:latin typeface="Courier New"/>
                 <a:ea typeface="Courier New"/>
                 <a:cs typeface="Courier New"/>
@@ -13503,13 +13757,10 @@
               <a:t>TeleOp</a:t>
             </a:r>
             <a:r>
-              <a:rPr lang="en" sz="700">
+              <a:rPr lang="en" sz="700" dirty="0">
                 <a:solidFill>
                   <a:srgbClr val="CC7832"/>
                 </a:solidFill>
-                <a:highlight>
-                  <a:schemeClr val="lt1"/>
-                </a:highlight>
                 <a:latin typeface="Courier New"/>
                 <a:ea typeface="Courier New"/>
                 <a:cs typeface="Courier New"/>
@@ -13517,13 +13768,10 @@
               </a:rPr>
               <a:t>;</a:t>
             </a:r>
-            <a:endParaRPr sz="700">
+            <a:endParaRPr sz="700" dirty="0">
               <a:solidFill>
                 <a:srgbClr val="CC7832"/>
               </a:solidFill>
-              <a:highlight>
-                <a:schemeClr val="lt1"/>
-              </a:highlight>
               <a:latin typeface="Courier New"/>
               <a:ea typeface="Courier New"/>
               <a:cs typeface="Courier New"/>
@@ -13541,13 +13789,10 @@
               <a:buNone/>
             </a:pPr>
             <a:r>
-              <a:rPr lang="en" sz="700">
+              <a:rPr lang="en" sz="700" dirty="0">
                 <a:solidFill>
                   <a:srgbClr val="CC7832"/>
                 </a:solidFill>
-                <a:highlight>
-                  <a:schemeClr val="lt1"/>
-                </a:highlight>
                 <a:latin typeface="Courier New"/>
                 <a:ea typeface="Courier New"/>
                 <a:cs typeface="Courier New"/>
@@ -13556,13 +13801,10 @@
               <a:t>import </a:t>
             </a:r>
             <a:r>
-              <a:rPr lang="en" sz="700">
+              <a:rPr lang="en" sz="700" dirty="0">
                 <a:solidFill>
                   <a:srgbClr val="A9B7C6"/>
                 </a:solidFill>
-                <a:highlight>
-                  <a:schemeClr val="lt1"/>
-                </a:highlight>
                 <a:latin typeface="Courier New"/>
                 <a:ea typeface="Courier New"/>
                 <a:cs typeface="Courier New"/>
@@ -13571,13 +13813,10 @@
               <a:t>com.qualcomm.robotcore.eventloop.opmode.OpMode</a:t>
             </a:r>
             <a:r>
-              <a:rPr lang="en" sz="700">
+              <a:rPr lang="en" sz="700" dirty="0">
                 <a:solidFill>
                   <a:srgbClr val="CC7832"/>
                 </a:solidFill>
-                <a:highlight>
-                  <a:schemeClr val="lt1"/>
-                </a:highlight>
                 <a:latin typeface="Courier New"/>
                 <a:ea typeface="Courier New"/>
                 <a:cs typeface="Courier New"/>
@@ -13585,13 +13824,10 @@
               </a:rPr>
               <a:t>;</a:t>
             </a:r>
-            <a:endParaRPr sz="700">
+            <a:endParaRPr sz="700" dirty="0">
               <a:solidFill>
                 <a:srgbClr val="CC7832"/>
               </a:solidFill>
-              <a:highlight>
-                <a:schemeClr val="lt1"/>
-              </a:highlight>
               <a:latin typeface="Courier New"/>
               <a:ea typeface="Courier New"/>
               <a:cs typeface="Courier New"/>
@@ -13608,13 +13844,10 @@
               </a:spcAft>
               <a:buNone/>
             </a:pPr>
-            <a:endParaRPr sz="700">
+            <a:endParaRPr sz="700" dirty="0">
               <a:solidFill>
                 <a:srgbClr val="CC7832"/>
               </a:solidFill>
-              <a:highlight>
-                <a:schemeClr val="lt1"/>
-              </a:highlight>
               <a:latin typeface="Courier New"/>
               <a:ea typeface="Courier New"/>
               <a:cs typeface="Courier New"/>
@@ -13632,13 +13865,10 @@
               <a:buNone/>
             </a:pPr>
             <a:r>
-              <a:rPr lang="en" sz="700">
+              <a:rPr lang="en" sz="700" dirty="0">
                 <a:solidFill>
                   <a:srgbClr val="BBB529"/>
                 </a:solidFill>
-                <a:highlight>
-                  <a:schemeClr val="lt1"/>
-                </a:highlight>
                 <a:latin typeface="Courier New"/>
                 <a:ea typeface="Courier New"/>
                 <a:cs typeface="Courier New"/>
@@ -13647,13 +13877,10 @@
               <a:t>@TeleOp </a:t>
             </a:r>
             <a:r>
-              <a:rPr lang="en" sz="700">
+              <a:rPr lang="en" sz="700" dirty="0">
                 <a:solidFill>
                   <a:srgbClr val="A9B7C6"/>
                 </a:solidFill>
-                <a:highlight>
-                  <a:schemeClr val="lt1"/>
-                </a:highlight>
                 <a:latin typeface="Courier New"/>
                 <a:ea typeface="Courier New"/>
                 <a:cs typeface="Courier New"/>
@@ -13662,13 +13889,10 @@
               <a:t>(group = </a:t>
             </a:r>
             <a:r>
-              <a:rPr lang="en" sz="700">
+              <a:rPr lang="en" sz="700" dirty="0">
                 <a:solidFill>
                   <a:srgbClr val="6A8759"/>
                 </a:solidFill>
-                <a:highlight>
-                  <a:schemeClr val="lt1"/>
-                </a:highlight>
                 <a:latin typeface="Courier New"/>
                 <a:ea typeface="Courier New"/>
                 <a:cs typeface="Courier New"/>
@@ -13677,13 +13901,10 @@
               <a:t>"Starters"</a:t>
             </a:r>
             <a:r>
-              <a:rPr lang="en" sz="700">
+              <a:rPr lang="en" sz="700" dirty="0">
                 <a:solidFill>
                   <a:srgbClr val="CC7832"/>
                 </a:solidFill>
-                <a:highlight>
-                  <a:schemeClr val="lt1"/>
-                </a:highlight>
                 <a:latin typeface="Courier New"/>
                 <a:ea typeface="Courier New"/>
                 <a:cs typeface="Courier New"/>
@@ -13692,13 +13913,10 @@
               <a:t>, </a:t>
             </a:r>
             <a:r>
-              <a:rPr lang="en" sz="700">
+              <a:rPr lang="en" sz="700" dirty="0">
                 <a:solidFill>
                   <a:srgbClr val="A9B7C6"/>
                 </a:solidFill>
-                <a:highlight>
-                  <a:schemeClr val="lt1"/>
-                </a:highlight>
                 <a:latin typeface="Courier New"/>
                 <a:ea typeface="Courier New"/>
                 <a:cs typeface="Courier New"/>
@@ -13707,13 +13925,10 @@
               <a:t>name = </a:t>
             </a:r>
             <a:r>
-              <a:rPr lang="en" sz="700">
+              <a:rPr lang="en" sz="700" dirty="0">
                 <a:solidFill>
                   <a:srgbClr val="6A8759"/>
                 </a:solidFill>
-                <a:highlight>
-                  <a:schemeClr val="lt1"/>
-                </a:highlight>
                 <a:latin typeface="Courier New"/>
                 <a:ea typeface="Courier New"/>
                 <a:cs typeface="Courier New"/>
@@ -13722,13 +13937,10 @@
               <a:t>"AutoStarter"</a:t>
             </a:r>
             <a:r>
-              <a:rPr lang="en" sz="700">
+              <a:rPr lang="en" sz="700" dirty="0">
                 <a:solidFill>
                   <a:srgbClr val="A9B7C6"/>
                 </a:solidFill>
-                <a:highlight>
-                  <a:schemeClr val="lt1"/>
-                </a:highlight>
                 <a:latin typeface="Courier New"/>
                 <a:ea typeface="Courier New"/>
                 <a:cs typeface="Courier New"/>
@@ -13736,13 +13948,10 @@
               </a:rPr>
               <a:t>)</a:t>
             </a:r>
-            <a:endParaRPr sz="700">
+            <a:endParaRPr sz="700" dirty="0">
               <a:solidFill>
                 <a:srgbClr val="A9B7C6"/>
               </a:solidFill>
-              <a:highlight>
-                <a:schemeClr val="lt1"/>
-              </a:highlight>
               <a:latin typeface="Courier New"/>
               <a:ea typeface="Courier New"/>
               <a:cs typeface="Courier New"/>
@@ -13760,13 +13969,10 @@
               <a:buNone/>
             </a:pPr>
             <a:r>
-              <a:rPr lang="en" sz="700">
+              <a:rPr lang="en" sz="700" dirty="0">
                 <a:solidFill>
                   <a:srgbClr val="CC7832"/>
                 </a:solidFill>
-                <a:highlight>
-                  <a:schemeClr val="lt1"/>
-                </a:highlight>
                 <a:latin typeface="Courier New"/>
                 <a:ea typeface="Courier New"/>
                 <a:cs typeface="Courier New"/>
@@ -13775,13 +13981,10 @@
               <a:t>public class </a:t>
             </a:r>
             <a:r>
-              <a:rPr lang="en" sz="700">
+              <a:rPr lang="en" sz="700" dirty="0">
                 <a:solidFill>
                   <a:srgbClr val="A9B7C6"/>
                 </a:solidFill>
-                <a:highlight>
-                  <a:schemeClr val="lt1"/>
-                </a:highlight>
                 <a:latin typeface="Courier New"/>
                 <a:ea typeface="Courier New"/>
                 <a:cs typeface="Courier New"/>
@@ -13790,13 +13993,10 @@
               <a:t>TeleOpStart </a:t>
             </a:r>
             <a:r>
-              <a:rPr lang="en" sz="700">
+              <a:rPr lang="en" sz="700" dirty="0">
                 <a:solidFill>
                   <a:srgbClr val="CC7832"/>
                 </a:solidFill>
-                <a:highlight>
-                  <a:schemeClr val="lt1"/>
-                </a:highlight>
                 <a:latin typeface="Courier New"/>
                 <a:ea typeface="Courier New"/>
                 <a:cs typeface="Courier New"/>
@@ -13805,13 +14005,10 @@
               <a:t>extends </a:t>
             </a:r>
             <a:r>
-              <a:rPr lang="en" sz="700">
+              <a:rPr lang="en" sz="700" dirty="0">
                 <a:solidFill>
                   <a:srgbClr val="A9B7C6"/>
                 </a:solidFill>
-                <a:highlight>
-                  <a:schemeClr val="lt1"/>
-                </a:highlight>
                 <a:latin typeface="Courier New"/>
                 <a:ea typeface="Courier New"/>
                 <a:cs typeface="Courier New"/>
@@ -13819,13 +14016,10 @@
               </a:rPr>
               <a:t>OpMode {</a:t>
             </a:r>
-            <a:endParaRPr sz="700">
+            <a:endParaRPr sz="700" dirty="0">
               <a:solidFill>
                 <a:srgbClr val="A9B7C6"/>
               </a:solidFill>
-              <a:highlight>
-                <a:schemeClr val="lt1"/>
-              </a:highlight>
               <a:latin typeface="Courier New"/>
               <a:ea typeface="Courier New"/>
               <a:cs typeface="Courier New"/>
@@ -13843,13 +14037,10 @@
               <a:buNone/>
             </a:pPr>
             <a:r>
-              <a:rPr lang="en" sz="700">
+              <a:rPr lang="en" sz="700" dirty="0">
                 <a:solidFill>
                   <a:srgbClr val="A9B7C6"/>
                 </a:solidFill>
-                <a:highlight>
-                  <a:schemeClr val="lt1"/>
-                </a:highlight>
                 <a:latin typeface="Courier New"/>
                 <a:ea typeface="Courier New"/>
                 <a:cs typeface="Courier New"/>
@@ -13858,13 +14049,10 @@
               <a:t>   </a:t>
             </a:r>
             <a:r>
-              <a:rPr lang="en" sz="700" i="1">
+              <a:rPr lang="en" sz="700" i="1" dirty="0">
                 <a:solidFill>
                   <a:srgbClr val="629755"/>
                 </a:solidFill>
-                <a:highlight>
-                  <a:schemeClr val="lt1"/>
-                </a:highlight>
                 <a:latin typeface="Courier New"/>
                 <a:ea typeface="Courier New"/>
                 <a:cs typeface="Courier New"/>
@@ -13872,13 +14060,10 @@
               </a:rPr>
               <a:t>/**</a:t>
             </a:r>
-            <a:endParaRPr sz="700" i="1">
+            <a:endParaRPr sz="700" i="1" dirty="0">
               <a:solidFill>
                 <a:srgbClr val="629755"/>
               </a:solidFill>
-              <a:highlight>
-                <a:schemeClr val="lt1"/>
-              </a:highlight>
               <a:latin typeface="Courier New"/>
               <a:ea typeface="Courier New"/>
               <a:cs typeface="Courier New"/>
@@ -13896,13 +14081,10 @@
               <a:buNone/>
             </a:pPr>
             <a:r>
-              <a:rPr lang="en" sz="700" i="1">
+              <a:rPr lang="en" sz="700" i="1" dirty="0">
                 <a:solidFill>
                   <a:srgbClr val="629755"/>
                 </a:solidFill>
-                <a:highlight>
-                  <a:schemeClr val="lt1"/>
-                </a:highlight>
                 <a:latin typeface="Courier New"/>
                 <a:ea typeface="Courier New"/>
                 <a:cs typeface="Courier New"/>
@@ -13910,13 +14092,10 @@
               </a:rPr>
               <a:t>    * define the motors, servos, sensors and so forth that you will use throughout your OpMode here</a:t>
             </a:r>
-            <a:endParaRPr sz="700" i="1">
+            <a:endParaRPr sz="700" i="1" dirty="0">
               <a:solidFill>
                 <a:srgbClr val="629755"/>
               </a:solidFill>
-              <a:highlight>
-                <a:schemeClr val="lt1"/>
-              </a:highlight>
               <a:latin typeface="Courier New"/>
               <a:ea typeface="Courier New"/>
               <a:cs typeface="Courier New"/>
@@ -13934,13 +14113,10 @@
               <a:buNone/>
             </a:pPr>
             <a:r>
-              <a:rPr lang="en" sz="700" i="1">
+              <a:rPr lang="en" sz="700" i="1" dirty="0">
                 <a:solidFill>
                   <a:srgbClr val="629755"/>
                 </a:solidFill>
-                <a:highlight>
-                  <a:schemeClr val="lt1"/>
-                </a:highlight>
                 <a:latin typeface="Courier New"/>
                 <a:ea typeface="Courier New"/>
                 <a:cs typeface="Courier New"/>
@@ -13948,13 +14124,10 @@
               </a:rPr>
               <a:t>    * remember to import</a:t>
             </a:r>
-            <a:endParaRPr sz="700" i="1">
+            <a:endParaRPr sz="700" i="1" dirty="0">
               <a:solidFill>
                 <a:srgbClr val="629755"/>
               </a:solidFill>
-              <a:highlight>
-                <a:schemeClr val="lt1"/>
-              </a:highlight>
               <a:latin typeface="Courier New"/>
               <a:ea typeface="Courier New"/>
               <a:cs typeface="Courier New"/>
@@ -13972,13 +14145,10 @@
               <a:buNone/>
             </a:pPr>
             <a:r>
-              <a:rPr lang="en" sz="700" i="1">
+              <a:rPr lang="en" sz="700" i="1" dirty="0">
                 <a:solidFill>
                   <a:srgbClr val="629755"/>
                 </a:solidFill>
-                <a:highlight>
-                  <a:schemeClr val="lt1"/>
-                </a:highlight>
                 <a:latin typeface="Courier New"/>
                 <a:ea typeface="Courier New"/>
                 <a:cs typeface="Courier New"/>
@@ -13986,13 +14156,10 @@
               </a:rPr>
               <a:t>    */</a:t>
             </a:r>
-            <a:endParaRPr sz="700" i="1">
+            <a:endParaRPr sz="700" i="1" dirty="0">
               <a:solidFill>
                 <a:srgbClr val="629755"/>
               </a:solidFill>
-              <a:highlight>
-                <a:schemeClr val="lt1"/>
-              </a:highlight>
               <a:latin typeface="Courier New"/>
               <a:ea typeface="Courier New"/>
               <a:cs typeface="Courier New"/>
@@ -14009,13 +14176,10 @@
               </a:spcAft>
               <a:buNone/>
             </a:pPr>
-            <a:endParaRPr sz="700" i="1">
+            <a:endParaRPr sz="700" i="1" dirty="0">
               <a:solidFill>
                 <a:srgbClr val="629755"/>
               </a:solidFill>
-              <a:highlight>
-                <a:schemeClr val="lt1"/>
-              </a:highlight>
               <a:latin typeface="Courier New"/>
               <a:ea typeface="Courier New"/>
               <a:cs typeface="Courier New"/>
@@ -14033,13 +14197,10 @@
               <a:buNone/>
             </a:pPr>
             <a:r>
-              <a:rPr lang="en" sz="700" i="1">
+              <a:rPr lang="en" sz="700" i="1" dirty="0">
                 <a:solidFill>
                   <a:srgbClr val="629755"/>
                 </a:solidFill>
-                <a:highlight>
-                  <a:schemeClr val="lt1"/>
-                </a:highlight>
                 <a:latin typeface="Courier New"/>
                 <a:ea typeface="Courier New"/>
                 <a:cs typeface="Courier New"/>
@@ -14047,13 +14208,10 @@
               </a:rPr>
               <a:t>   /**</a:t>
             </a:r>
-            <a:endParaRPr sz="700" i="1">
+            <a:endParaRPr sz="700" i="1" dirty="0">
               <a:solidFill>
                 <a:srgbClr val="629755"/>
               </a:solidFill>
-              <a:highlight>
-                <a:schemeClr val="lt1"/>
-              </a:highlight>
               <a:latin typeface="Courier New"/>
               <a:ea typeface="Courier New"/>
               <a:cs typeface="Courier New"/>
@@ -14071,13 +14229,10 @@
               <a:buNone/>
             </a:pPr>
             <a:r>
-              <a:rPr lang="en" sz="700" i="1">
+              <a:rPr lang="en" sz="700" i="1" dirty="0">
                 <a:solidFill>
                   <a:srgbClr val="629755"/>
                 </a:solidFill>
-                <a:highlight>
-                  <a:schemeClr val="lt1"/>
-                </a:highlight>
                 <a:latin typeface="Courier New"/>
                 <a:ea typeface="Courier New"/>
                 <a:cs typeface="Courier New"/>
@@ -14085,13 +14240,10 @@
               </a:rPr>
               <a:t>    * this is where you should initialise all of your variables you just defined, this is what runs</a:t>
             </a:r>
-            <a:endParaRPr sz="700" i="1">
+            <a:endParaRPr sz="700" i="1" dirty="0">
               <a:solidFill>
                 <a:srgbClr val="629755"/>
               </a:solidFill>
-              <a:highlight>
-                <a:schemeClr val="lt1"/>
-              </a:highlight>
               <a:latin typeface="Courier New"/>
               <a:ea typeface="Courier New"/>
               <a:cs typeface="Courier New"/>
@@ -14109,13 +14261,10 @@
               <a:buNone/>
             </a:pPr>
             <a:r>
-              <a:rPr lang="en" sz="700" i="1">
+              <a:rPr lang="en" sz="700" i="1" dirty="0">
                 <a:solidFill>
                   <a:srgbClr val="629755"/>
                 </a:solidFill>
-                <a:highlight>
-                  <a:schemeClr val="lt1"/>
-                </a:highlight>
                 <a:latin typeface="Courier New"/>
                 <a:ea typeface="Courier New"/>
                 <a:cs typeface="Courier New"/>
@@ -14123,13 +14272,10 @@
               </a:rPr>
               <a:t>    * when you press the init button</a:t>
             </a:r>
-            <a:endParaRPr sz="700" i="1">
+            <a:endParaRPr sz="700" i="1" dirty="0">
               <a:solidFill>
                 <a:srgbClr val="629755"/>
               </a:solidFill>
-              <a:highlight>
-                <a:schemeClr val="lt1"/>
-              </a:highlight>
               <a:latin typeface="Courier New"/>
               <a:ea typeface="Courier New"/>
               <a:cs typeface="Courier New"/>
@@ -14147,13 +14293,10 @@
               <a:buNone/>
             </a:pPr>
             <a:r>
-              <a:rPr lang="en" sz="700" i="1">
+              <a:rPr lang="en" sz="700" i="1" dirty="0">
                 <a:solidFill>
                   <a:srgbClr val="629755"/>
                 </a:solidFill>
-                <a:highlight>
-                  <a:schemeClr val="lt1"/>
-                </a:highlight>
                 <a:latin typeface="Courier New"/>
                 <a:ea typeface="Courier New"/>
                 <a:cs typeface="Courier New"/>
@@ -14161,13 +14304,10 @@
               </a:rPr>
               <a:t>    */</a:t>
             </a:r>
-            <a:endParaRPr sz="700" i="1">
+            <a:endParaRPr sz="700" i="1" dirty="0">
               <a:solidFill>
                 <a:srgbClr val="629755"/>
               </a:solidFill>
-              <a:highlight>
-                <a:schemeClr val="lt1"/>
-              </a:highlight>
               <a:latin typeface="Courier New"/>
               <a:ea typeface="Courier New"/>
               <a:cs typeface="Courier New"/>
@@ -14185,13 +14325,10 @@
               <a:buNone/>
             </a:pPr>
             <a:r>
-              <a:rPr lang="en" sz="700" i="1">
+              <a:rPr lang="en" sz="700" i="1" dirty="0">
                 <a:solidFill>
                   <a:srgbClr val="629755"/>
                 </a:solidFill>
-                <a:highlight>
-                  <a:schemeClr val="lt1"/>
-                </a:highlight>
                 <a:latin typeface="Courier New"/>
                 <a:ea typeface="Courier New"/>
                 <a:cs typeface="Courier New"/>
@@ -14200,13 +14337,10 @@
               <a:t>   </a:t>
             </a:r>
             <a:r>
-              <a:rPr lang="en" sz="700">
+              <a:rPr lang="en" sz="700" dirty="0">
                 <a:solidFill>
                   <a:srgbClr val="BBB529"/>
                 </a:solidFill>
-                <a:highlight>
-                  <a:schemeClr val="lt1"/>
-                </a:highlight>
                 <a:latin typeface="Courier New"/>
                 <a:ea typeface="Courier New"/>
                 <a:cs typeface="Courier New"/>
@@ -14214,13 +14348,10 @@
               </a:rPr>
               <a:t>@Override</a:t>
             </a:r>
-            <a:endParaRPr sz="700">
+            <a:endParaRPr sz="700" dirty="0">
               <a:solidFill>
                 <a:srgbClr val="BBB529"/>
               </a:solidFill>
-              <a:highlight>
-                <a:schemeClr val="lt1"/>
-              </a:highlight>
               <a:latin typeface="Courier New"/>
               <a:ea typeface="Courier New"/>
               <a:cs typeface="Courier New"/>
@@ -14238,13 +14369,10 @@
               <a:buNone/>
             </a:pPr>
             <a:r>
-              <a:rPr lang="en" sz="700">
+              <a:rPr lang="en" sz="700" dirty="0">
                 <a:solidFill>
                   <a:srgbClr val="BBB529"/>
                 </a:solidFill>
-                <a:highlight>
-                  <a:schemeClr val="lt1"/>
-                </a:highlight>
                 <a:latin typeface="Courier New"/>
                 <a:ea typeface="Courier New"/>
                 <a:cs typeface="Courier New"/>
@@ -14253,13 +14381,10 @@
               <a:t>   </a:t>
             </a:r>
             <a:r>
-              <a:rPr lang="en" sz="700">
+              <a:rPr lang="en" sz="700" dirty="0">
                 <a:solidFill>
                   <a:srgbClr val="CC7832"/>
                 </a:solidFill>
-                <a:highlight>
-                  <a:schemeClr val="lt1"/>
-                </a:highlight>
                 <a:latin typeface="Courier New"/>
                 <a:ea typeface="Courier New"/>
                 <a:cs typeface="Courier New"/>
@@ -14268,13 +14393,10 @@
               <a:t>public void </a:t>
             </a:r>
             <a:r>
-              <a:rPr lang="en" sz="700">
+              <a:rPr lang="en" sz="700" dirty="0">
                 <a:solidFill>
                   <a:srgbClr val="FFC66D"/>
                 </a:solidFill>
-                <a:highlight>
-                  <a:schemeClr val="lt1"/>
-                </a:highlight>
                 <a:latin typeface="Courier New"/>
                 <a:ea typeface="Courier New"/>
                 <a:cs typeface="Courier New"/>
@@ -14283,13 +14405,10 @@
               <a:t>init</a:t>
             </a:r>
             <a:r>
-              <a:rPr lang="en" sz="700">
+              <a:rPr lang="en" sz="700" dirty="0">
                 <a:solidFill>
                   <a:srgbClr val="A9B7C6"/>
                 </a:solidFill>
-                <a:highlight>
-                  <a:schemeClr val="lt1"/>
-                </a:highlight>
                 <a:latin typeface="Courier New"/>
                 <a:ea typeface="Courier New"/>
                 <a:cs typeface="Courier New"/>
@@ -14297,13 +14416,10 @@
               </a:rPr>
               <a:t>() {</a:t>
             </a:r>
-            <a:endParaRPr sz="700">
+            <a:endParaRPr sz="700" dirty="0">
               <a:solidFill>
                 <a:srgbClr val="A9B7C6"/>
               </a:solidFill>
-              <a:highlight>
-                <a:schemeClr val="lt1"/>
-              </a:highlight>
               <a:latin typeface="Courier New"/>
               <a:ea typeface="Courier New"/>
               <a:cs typeface="Courier New"/>
@@ -14320,13 +14436,10 @@
               </a:spcAft>
               <a:buNone/>
             </a:pPr>
-            <a:endParaRPr sz="700">
+            <a:endParaRPr sz="700" dirty="0">
               <a:solidFill>
                 <a:srgbClr val="A9B7C6"/>
               </a:solidFill>
-              <a:highlight>
-                <a:schemeClr val="lt1"/>
-              </a:highlight>
               <a:latin typeface="Courier New"/>
               <a:ea typeface="Courier New"/>
               <a:cs typeface="Courier New"/>
@@ -14344,13 +14457,10 @@
               <a:buNone/>
             </a:pPr>
             <a:r>
-              <a:rPr lang="en" sz="700">
+              <a:rPr lang="en" sz="700" dirty="0">
                 <a:solidFill>
                   <a:srgbClr val="A9B7C6"/>
                 </a:solidFill>
-                <a:highlight>
-                  <a:schemeClr val="lt1"/>
-                </a:highlight>
                 <a:latin typeface="Courier New"/>
                 <a:ea typeface="Courier New"/>
                 <a:cs typeface="Courier New"/>
@@ -14358,13 +14468,10 @@
               </a:rPr>
               <a:t>   }</a:t>
             </a:r>
-            <a:endParaRPr sz="700">
+            <a:endParaRPr sz="700" dirty="0">
               <a:solidFill>
                 <a:srgbClr val="A9B7C6"/>
               </a:solidFill>
-              <a:highlight>
-                <a:schemeClr val="lt1"/>
-              </a:highlight>
               <a:latin typeface="Courier New"/>
               <a:ea typeface="Courier New"/>
               <a:cs typeface="Courier New"/>
@@ -14381,13 +14488,10 @@
               </a:spcAft>
               <a:buNone/>
             </a:pPr>
-            <a:endParaRPr sz="700">
+            <a:endParaRPr sz="700" dirty="0">
               <a:solidFill>
                 <a:srgbClr val="A9B7C6"/>
               </a:solidFill>
-              <a:highlight>
-                <a:schemeClr val="lt1"/>
-              </a:highlight>
               <a:latin typeface="Courier New"/>
               <a:ea typeface="Courier New"/>
               <a:cs typeface="Courier New"/>
@@ -14405,13 +14509,10 @@
               <a:buNone/>
             </a:pPr>
             <a:r>
-              <a:rPr lang="en" sz="700">
+              <a:rPr lang="en" sz="700" dirty="0">
                 <a:solidFill>
                   <a:srgbClr val="A9B7C6"/>
                 </a:solidFill>
-                <a:highlight>
-                  <a:schemeClr val="lt1"/>
-                </a:highlight>
                 <a:latin typeface="Courier New"/>
                 <a:ea typeface="Courier New"/>
                 <a:cs typeface="Courier New"/>
@@ -14420,13 +14521,10 @@
               <a:t>   </a:t>
             </a:r>
             <a:r>
-              <a:rPr lang="en" sz="700" i="1">
+              <a:rPr lang="en" sz="700" i="1" dirty="0">
                 <a:solidFill>
                   <a:srgbClr val="629755"/>
                 </a:solidFill>
-                <a:highlight>
-                  <a:schemeClr val="lt1"/>
-                </a:highlight>
                 <a:latin typeface="Courier New"/>
                 <a:ea typeface="Courier New"/>
                 <a:cs typeface="Courier New"/>
@@ -14434,13 +14532,10 @@
               </a:rPr>
               <a:t>/**</a:t>
             </a:r>
-            <a:endParaRPr sz="700" i="1">
+            <a:endParaRPr sz="700" i="1" dirty="0">
               <a:solidFill>
                 <a:srgbClr val="629755"/>
               </a:solidFill>
-              <a:highlight>
-                <a:schemeClr val="lt1"/>
-              </a:highlight>
               <a:latin typeface="Courier New"/>
               <a:ea typeface="Courier New"/>
               <a:cs typeface="Courier New"/>
@@ -14458,13 +14553,10 @@
               <a:buNone/>
             </a:pPr>
             <a:r>
-              <a:rPr lang="en" sz="700" i="1">
+              <a:rPr lang="en" sz="700" i="1" dirty="0">
                 <a:solidFill>
                   <a:srgbClr val="629755"/>
                 </a:solidFill>
-                <a:highlight>
-                  <a:schemeClr val="lt1"/>
-                </a:highlight>
                 <a:latin typeface="Courier New"/>
                 <a:ea typeface="Courier New"/>
                 <a:cs typeface="Courier New"/>
@@ -14472,13 +14564,10 @@
               </a:rPr>
               <a:t>    * this is the "main" function. it runs when you press the play button for this OpMode</a:t>
             </a:r>
-            <a:endParaRPr sz="700" i="1">
+            <a:endParaRPr sz="700" i="1" dirty="0">
               <a:solidFill>
                 <a:srgbClr val="629755"/>
               </a:solidFill>
-              <a:highlight>
-                <a:schemeClr val="lt1"/>
-              </a:highlight>
               <a:latin typeface="Courier New"/>
               <a:ea typeface="Courier New"/>
               <a:cs typeface="Courier New"/>
@@ -14496,13 +14585,10 @@
               <a:buNone/>
             </a:pPr>
             <a:r>
-              <a:rPr lang="en" sz="700" i="1">
+              <a:rPr lang="en" sz="700" i="1" dirty="0">
                 <a:solidFill>
                   <a:srgbClr val="629755"/>
                 </a:solidFill>
-                <a:highlight>
-                  <a:schemeClr val="lt1"/>
-                </a:highlight>
                 <a:latin typeface="Courier New"/>
                 <a:ea typeface="Courier New"/>
                 <a:cs typeface="Courier New"/>
@@ -14510,13 +14596,10 @@
               </a:rPr>
               <a:t>    * it is a loop so will run continuously until you press stop</a:t>
             </a:r>
-            <a:endParaRPr sz="700" i="1">
+            <a:endParaRPr sz="700" i="1" dirty="0">
               <a:solidFill>
                 <a:srgbClr val="629755"/>
               </a:solidFill>
-              <a:highlight>
-                <a:schemeClr val="lt1"/>
-              </a:highlight>
               <a:latin typeface="Courier New"/>
               <a:ea typeface="Courier New"/>
               <a:cs typeface="Courier New"/>
@@ -14534,13 +14617,10 @@
               <a:buNone/>
             </a:pPr>
             <a:r>
-              <a:rPr lang="en" sz="700" i="1">
+              <a:rPr lang="en" sz="700" i="1" dirty="0">
                 <a:solidFill>
                   <a:srgbClr val="629755"/>
                 </a:solidFill>
-                <a:highlight>
-                  <a:schemeClr val="lt1"/>
-                </a:highlight>
                 <a:latin typeface="Courier New"/>
                 <a:ea typeface="Courier New"/>
                 <a:cs typeface="Courier New"/>
@@ -14548,13 +14628,10 @@
               </a:rPr>
               <a:t>    */</a:t>
             </a:r>
-            <a:endParaRPr sz="700" i="1">
+            <a:endParaRPr sz="700" i="1" dirty="0">
               <a:solidFill>
                 <a:srgbClr val="629755"/>
               </a:solidFill>
-              <a:highlight>
-                <a:schemeClr val="lt1"/>
-              </a:highlight>
               <a:latin typeface="Courier New"/>
               <a:ea typeface="Courier New"/>
               <a:cs typeface="Courier New"/>
@@ -14572,13 +14649,10 @@
               <a:buNone/>
             </a:pPr>
             <a:r>
-              <a:rPr lang="en" sz="700" i="1">
+              <a:rPr lang="en" sz="700" i="1" dirty="0">
                 <a:solidFill>
                   <a:srgbClr val="629755"/>
                 </a:solidFill>
-                <a:highlight>
-                  <a:schemeClr val="lt1"/>
-                </a:highlight>
                 <a:latin typeface="Courier New"/>
                 <a:ea typeface="Courier New"/>
                 <a:cs typeface="Courier New"/>
@@ -14587,13 +14661,10 @@
               <a:t>   </a:t>
             </a:r>
             <a:r>
-              <a:rPr lang="en" sz="700">
+              <a:rPr lang="en" sz="700" dirty="0">
                 <a:solidFill>
                   <a:srgbClr val="BBB529"/>
                 </a:solidFill>
-                <a:highlight>
-                  <a:schemeClr val="lt1"/>
-                </a:highlight>
                 <a:latin typeface="Courier New"/>
                 <a:ea typeface="Courier New"/>
                 <a:cs typeface="Courier New"/>
@@ -14601,13 +14672,10 @@
               </a:rPr>
               <a:t>@Override</a:t>
             </a:r>
-            <a:endParaRPr sz="700">
+            <a:endParaRPr sz="700" dirty="0">
               <a:solidFill>
                 <a:srgbClr val="BBB529"/>
               </a:solidFill>
-              <a:highlight>
-                <a:schemeClr val="lt1"/>
-              </a:highlight>
               <a:latin typeface="Courier New"/>
               <a:ea typeface="Courier New"/>
               <a:cs typeface="Courier New"/>
@@ -14625,13 +14693,10 @@
               <a:buNone/>
             </a:pPr>
             <a:r>
-              <a:rPr lang="en" sz="700">
+              <a:rPr lang="en" sz="700" dirty="0">
                 <a:solidFill>
                   <a:srgbClr val="BBB529"/>
                 </a:solidFill>
-                <a:highlight>
-                  <a:schemeClr val="lt1"/>
-                </a:highlight>
                 <a:latin typeface="Courier New"/>
                 <a:ea typeface="Courier New"/>
                 <a:cs typeface="Courier New"/>
@@ -14640,13 +14705,10 @@
               <a:t>   </a:t>
             </a:r>
             <a:r>
-              <a:rPr lang="en" sz="700">
+              <a:rPr lang="en" sz="700" dirty="0">
                 <a:solidFill>
                   <a:srgbClr val="CC7832"/>
                 </a:solidFill>
-                <a:highlight>
-                  <a:schemeClr val="lt1"/>
-                </a:highlight>
                 <a:latin typeface="Courier New"/>
                 <a:ea typeface="Courier New"/>
                 <a:cs typeface="Courier New"/>
@@ -14655,13 +14717,10 @@
               <a:t>public void </a:t>
             </a:r>
             <a:r>
-              <a:rPr lang="en" sz="700">
+              <a:rPr lang="en" sz="700" dirty="0">
                 <a:solidFill>
                   <a:srgbClr val="FFC66D"/>
                 </a:solidFill>
-                <a:highlight>
-                  <a:schemeClr val="lt1"/>
-                </a:highlight>
                 <a:latin typeface="Courier New"/>
                 <a:ea typeface="Courier New"/>
                 <a:cs typeface="Courier New"/>
@@ -14670,13 +14729,10 @@
               <a:t>loop</a:t>
             </a:r>
             <a:r>
-              <a:rPr lang="en" sz="700">
+              <a:rPr lang="en" sz="700" dirty="0">
                 <a:solidFill>
                   <a:srgbClr val="A9B7C6"/>
                 </a:solidFill>
-                <a:highlight>
-                  <a:schemeClr val="lt1"/>
-                </a:highlight>
                 <a:latin typeface="Courier New"/>
                 <a:ea typeface="Courier New"/>
                 <a:cs typeface="Courier New"/>
@@ -14684,13 +14740,10 @@
               </a:rPr>
               <a:t>() {</a:t>
             </a:r>
-            <a:endParaRPr sz="700">
+            <a:endParaRPr sz="700" dirty="0">
               <a:solidFill>
                 <a:srgbClr val="A9B7C6"/>
               </a:solidFill>
-              <a:highlight>
-                <a:schemeClr val="lt1"/>
-              </a:highlight>
               <a:latin typeface="Courier New"/>
               <a:ea typeface="Courier New"/>
               <a:cs typeface="Courier New"/>
@@ -14707,13 +14760,10 @@
               </a:spcAft>
               <a:buNone/>
             </a:pPr>
-            <a:endParaRPr sz="700">
+            <a:endParaRPr sz="700" dirty="0">
               <a:solidFill>
                 <a:srgbClr val="A9B7C6"/>
               </a:solidFill>
-              <a:highlight>
-                <a:schemeClr val="lt1"/>
-              </a:highlight>
               <a:latin typeface="Courier New"/>
               <a:ea typeface="Courier New"/>
               <a:cs typeface="Courier New"/>
@@ -14731,13 +14781,10 @@
               <a:buNone/>
             </a:pPr>
             <a:r>
-              <a:rPr lang="en" sz="700">
+              <a:rPr lang="en" sz="700" dirty="0">
                 <a:solidFill>
                   <a:srgbClr val="A9B7C6"/>
                 </a:solidFill>
-                <a:highlight>
-                  <a:schemeClr val="lt1"/>
-                </a:highlight>
                 <a:latin typeface="Courier New"/>
                 <a:ea typeface="Courier New"/>
                 <a:cs typeface="Courier New"/>
@@ -14745,13 +14792,10 @@
               </a:rPr>
               <a:t>      </a:t>
             </a:r>
-            <a:endParaRPr sz="700">
+            <a:endParaRPr sz="700" dirty="0">
               <a:solidFill>
                 <a:srgbClr val="A9B7C6"/>
               </a:solidFill>
-              <a:highlight>
-                <a:schemeClr val="lt1"/>
-              </a:highlight>
               <a:latin typeface="Courier New"/>
               <a:ea typeface="Courier New"/>
               <a:cs typeface="Courier New"/>
@@ -14769,13 +14813,10 @@
               <a:buNone/>
             </a:pPr>
             <a:r>
-              <a:rPr lang="en" sz="700">
+              <a:rPr lang="en" sz="700" dirty="0">
                 <a:solidFill>
                   <a:srgbClr val="A9B7C6"/>
                 </a:solidFill>
-                <a:highlight>
-                  <a:schemeClr val="lt1"/>
-                </a:highlight>
                 <a:latin typeface="Courier New"/>
                 <a:ea typeface="Courier New"/>
                 <a:cs typeface="Courier New"/>
@@ -14783,13 +14824,10 @@
               </a:rPr>
               <a:t>   }</a:t>
             </a:r>
-            <a:endParaRPr sz="700">
+            <a:endParaRPr sz="700" dirty="0">
               <a:solidFill>
                 <a:srgbClr val="A9B7C6"/>
               </a:solidFill>
-              <a:highlight>
-                <a:schemeClr val="lt1"/>
-              </a:highlight>
               <a:latin typeface="Courier New"/>
               <a:ea typeface="Courier New"/>
               <a:cs typeface="Courier New"/>
@@ -14806,13 +14844,10 @@
               </a:spcAft>
               <a:buNone/>
             </a:pPr>
-            <a:endParaRPr sz="700">
+            <a:endParaRPr sz="700" dirty="0">
               <a:solidFill>
                 <a:srgbClr val="A9B7C6"/>
               </a:solidFill>
-              <a:highlight>
-                <a:schemeClr val="lt1"/>
-              </a:highlight>
               <a:latin typeface="Courier New"/>
               <a:ea typeface="Courier New"/>
               <a:cs typeface="Courier New"/>
@@ -14830,13 +14865,10 @@
               <a:buNone/>
             </a:pPr>
             <a:r>
-              <a:rPr lang="en" sz="700">
+              <a:rPr lang="en" sz="700" dirty="0">
                 <a:solidFill>
                   <a:srgbClr val="A9B7C6"/>
                 </a:solidFill>
-                <a:highlight>
-                  <a:schemeClr val="lt1"/>
-                </a:highlight>
                 <a:latin typeface="Courier New"/>
                 <a:ea typeface="Courier New"/>
                 <a:cs typeface="Courier New"/>
@@ -14845,13 +14877,10 @@
               <a:t>   </a:t>
             </a:r>
             <a:r>
-              <a:rPr lang="en" sz="700" i="1">
+              <a:rPr lang="en" sz="700" i="1" dirty="0">
                 <a:solidFill>
                   <a:srgbClr val="629755"/>
                 </a:solidFill>
-                <a:highlight>
-                  <a:schemeClr val="lt1"/>
-                </a:highlight>
                 <a:latin typeface="Courier New"/>
                 <a:ea typeface="Courier New"/>
                 <a:cs typeface="Courier New"/>
@@ -14859,13 +14888,10 @@
               </a:rPr>
               <a:t>/**</a:t>
             </a:r>
-            <a:endParaRPr sz="700" i="1">
+            <a:endParaRPr sz="700" i="1" dirty="0">
               <a:solidFill>
                 <a:srgbClr val="629755"/>
               </a:solidFill>
-              <a:highlight>
-                <a:schemeClr val="lt1"/>
-              </a:highlight>
               <a:latin typeface="Courier New"/>
               <a:ea typeface="Courier New"/>
               <a:cs typeface="Courier New"/>
@@ -14883,13 +14909,10 @@
               <a:buNone/>
             </a:pPr>
             <a:r>
-              <a:rPr lang="en" sz="700" i="1">
+              <a:rPr lang="en" sz="700" i="1" dirty="0">
                 <a:solidFill>
                   <a:srgbClr val="629755"/>
                 </a:solidFill>
-                <a:highlight>
-                  <a:schemeClr val="lt1"/>
-                </a:highlight>
                 <a:latin typeface="Courier New"/>
                 <a:ea typeface="Courier New"/>
                 <a:cs typeface="Courier New"/>
@@ -14897,13 +14920,10 @@
               </a:rPr>
               <a:t>    * this is where you should define helper functions for your main code</a:t>
             </a:r>
-            <a:endParaRPr sz="700" i="1">
+            <a:endParaRPr sz="700" i="1" dirty="0">
               <a:solidFill>
                 <a:srgbClr val="629755"/>
               </a:solidFill>
-              <a:highlight>
-                <a:schemeClr val="lt1"/>
-              </a:highlight>
               <a:latin typeface="Courier New"/>
               <a:ea typeface="Courier New"/>
               <a:cs typeface="Courier New"/>
@@ -14921,13 +14941,10 @@
               <a:buNone/>
             </a:pPr>
             <a:r>
-              <a:rPr lang="en" sz="700" i="1">
+              <a:rPr lang="en" sz="700" i="1" dirty="0">
                 <a:solidFill>
                   <a:srgbClr val="629755"/>
                 </a:solidFill>
-                <a:highlight>
-                  <a:schemeClr val="lt1"/>
-                </a:highlight>
                 <a:latin typeface="Courier New"/>
                 <a:ea typeface="Courier New"/>
                 <a:cs typeface="Courier New"/>
@@ -14935,13 +14952,10 @@
               </a:rPr>
               <a:t>    */</a:t>
             </a:r>
-            <a:endParaRPr sz="700" i="1">
+            <a:endParaRPr sz="700" i="1" dirty="0">
               <a:solidFill>
                 <a:srgbClr val="629755"/>
               </a:solidFill>
-              <a:highlight>
-                <a:schemeClr val="lt1"/>
-              </a:highlight>
               <a:latin typeface="Courier New"/>
               <a:ea typeface="Courier New"/>
               <a:cs typeface="Courier New"/>
@@ -14959,13 +14973,10 @@
               <a:buNone/>
             </a:pPr>
             <a:r>
-              <a:rPr lang="en" sz="700">
+              <a:rPr lang="en" sz="700" dirty="0">
                 <a:solidFill>
                   <a:srgbClr val="A9B7C6"/>
                 </a:solidFill>
-                <a:highlight>
-                  <a:schemeClr val="lt1"/>
-                </a:highlight>
                 <a:latin typeface="Courier New"/>
                 <a:ea typeface="Courier New"/>
                 <a:cs typeface="Courier New"/>
@@ -14973,13 +14984,10 @@
               </a:rPr>
               <a:t>}</a:t>
             </a:r>
-            <a:endParaRPr sz="700">
+            <a:endParaRPr sz="700" dirty="0">
               <a:solidFill>
                 <a:srgbClr val="A9B7C6"/>
               </a:solidFill>
-              <a:highlight>
-                <a:schemeClr val="lt1"/>
-              </a:highlight>
               <a:latin typeface="Courier New"/>
               <a:ea typeface="Courier New"/>
               <a:cs typeface="Courier New"/>

</xml_diff>